<commit_message>
duda linea 95... aqui como ago para poder editar ??
</commit_message>
<xml_diff>
--- a/ene-jun-2018/Estefania Sosa Garcia/presentaciones/Ejecución de pruebas de software.pptx
+++ b/ene-jun-2018/Estefania Sosa Garcia/presentaciones/Ejecución de pruebas de software.pptx
@@ -7974,7 +7974,7 @@
 <dgm:dataModel xmlns:dgm="http://schemas.openxmlformats.org/drawingml/2006/diagram" xmlns:a="http://schemas.openxmlformats.org/drawingml/2006/main">
   <dgm:ptLst>
     <dgm:pt modelId="{6B44C181-C730-4784-90FD-CADC8DE569A2}" type="doc">
-      <dgm:prSet loTypeId="urn:microsoft.com/office/officeart/2005/8/layout/cycle6" loCatId="relationship" qsTypeId="urn:microsoft.com/office/officeart/2005/8/quickstyle/simple1" qsCatId="simple" csTypeId="urn:microsoft.com/office/officeart/2005/8/colors/accent1_2" csCatId="accent1"/>
+      <dgm:prSet loTypeId="urn:microsoft.com/office/officeart/2005/8/layout/cycle6" loCatId="relationship" qsTypeId="urn:microsoft.com/office/officeart/2005/8/quickstyle/simple1" qsCatId="simple" csTypeId="urn:microsoft.com/office/officeart/2005/8/colors/accent1_2" csCatId="accent1" phldr="1"/>
       <dgm:spPr/>
       <dgm:t>
         <a:bodyPr/>
@@ -8136,9 +8136,13 @@
         <a:lstStyle/>
         <a:p>
           <a:r>
-            <a:rPr lang="es-MX"/>
-            <a:t>Bath</a:t>
+            <a:rPr lang="es-MX" dirty="0" err="1"/>
+            <a:t>Path</a:t>
           </a:r>
+          <a:endParaRPr lang="es-MX" dirty="0"/>
+        </a:p>
+        <a:p>
+          <a:endParaRPr lang="es-MX" dirty="0"/>
         </a:p>
       </dgm:t>
     </dgm:pt>
@@ -13189,9 +13193,25 @@
             <a:buNone/>
           </a:pPr>
           <a:r>
-            <a:rPr lang="es-MX" sz="1500" kern="1200"/>
-            <a:t>Bath</a:t>
+            <a:rPr lang="es-MX" sz="1500" kern="1200" dirty="0" err="1"/>
+            <a:t>Path</a:t>
           </a:r>
+          <a:endParaRPr lang="es-MX" sz="1500" kern="1200" dirty="0"/>
+        </a:p>
+        <a:p>
+          <a:pPr marL="0" lvl="0" indent="0" algn="ctr" defTabSz="666750">
+            <a:lnSpc>
+              <a:spcPct val="90000"/>
+            </a:lnSpc>
+            <a:spcBef>
+              <a:spcPct val="0"/>
+            </a:spcBef>
+            <a:spcAft>
+              <a:spcPct val="35000"/>
+            </a:spcAft>
+            <a:buNone/>
+          </a:pPr>
+          <a:endParaRPr lang="es-MX" sz="1500" kern="1200" dirty="0"/>
         </a:p>
       </dsp:txBody>
       <dsp:txXfrm>
@@ -14883,7 +14903,7 @@
       </dsp:nvSpPr>
       <dsp:spPr>
         <a:xfrm>
-          <a:off x="4325112" y="1146657"/>
+          <a:off x="4325111" y="1146657"/>
           <a:ext cx="1408176" cy="1408176"/>
         </a:xfrm>
         <a:prstGeom prst="ellipse">
@@ -38981,7 +39001,7 @@
             <p:ph idx="1"/>
             <p:extLst>
               <p:ext uri="{D42A27DB-BD31-4B8C-83A1-F6EECF244321}">
-                <p14:modId xmlns:p14="http://schemas.microsoft.com/office/powerpoint/2010/main" val="3439519370"/>
+                <p14:modId xmlns:p14="http://schemas.microsoft.com/office/powerpoint/2010/main" val="1936626790"/>
               </p:ext>
             </p:extLst>
           </p:nvPr>

</xml_diff>